<commit_message>
update in admin view
</commit_message>
<xml_diff>
--- a/Documantation/Blood donation.pptx
+++ b/Documantation/Blood donation.pptx
@@ -106,6 +106,22 @@
       </a:defRPr>
     </a:lvl9pPr>
   </p:defaultTextStyle>
+  <p:extLst>
+    <p:ext uri="{EFAFB233-063F-42B5-8137-9DF3F51BA10A}">
+      <p15:sldGuideLst xmlns:p15="http://schemas.microsoft.com/office/powerpoint/2012/main">
+        <p15:guide id="1" orient="horz" pos="2160">
+          <p15:clr>
+            <a:srgbClr val="A4A3A4"/>
+          </p15:clr>
+        </p15:guide>
+        <p15:guide id="2" pos="2880">
+          <p15:clr>
+            <a:srgbClr val="A4A3A4"/>
+          </p15:clr>
+        </p15:guide>
+      </p15:sldGuideLst>
+    </p:ext>
+  </p:extLst>
 </p:presentation>
 </file>
 
@@ -291,7 +307,7 @@
             <a:fld id="{23B2260A-7C61-451E-ACDE-7DEE4EF3F87B}" type="datetimeFigureOut">
               <a:rPr lang="en-US" smtClean="0"/>
               <a:pPr/>
-              <a:t>6/17/2014</a:t>
+              <a:t>6/18/2014</a:t>
             </a:fld>
             <a:endParaRPr lang="en-US"/>
           </a:p>
@@ -458,7 +474,7 @@
             <a:fld id="{23B2260A-7C61-451E-ACDE-7DEE4EF3F87B}" type="datetimeFigureOut">
               <a:rPr lang="en-US" smtClean="0"/>
               <a:pPr/>
-              <a:t>6/17/2014</a:t>
+              <a:t>6/18/2014</a:t>
             </a:fld>
             <a:endParaRPr lang="en-US"/>
           </a:p>
@@ -635,7 +651,7 @@
             <a:fld id="{23B2260A-7C61-451E-ACDE-7DEE4EF3F87B}" type="datetimeFigureOut">
               <a:rPr lang="en-US" smtClean="0"/>
               <a:pPr/>
-              <a:t>6/17/2014</a:t>
+              <a:t>6/18/2014</a:t>
             </a:fld>
             <a:endParaRPr lang="en-US"/>
           </a:p>
@@ -802,7 +818,7 @@
             <a:fld id="{23B2260A-7C61-451E-ACDE-7DEE4EF3F87B}" type="datetimeFigureOut">
               <a:rPr lang="en-US" smtClean="0"/>
               <a:pPr/>
-              <a:t>6/17/2014</a:t>
+              <a:t>6/18/2014</a:t>
             </a:fld>
             <a:endParaRPr lang="en-US"/>
           </a:p>
@@ -1045,7 +1061,7 @@
             <a:fld id="{23B2260A-7C61-451E-ACDE-7DEE4EF3F87B}" type="datetimeFigureOut">
               <a:rPr lang="en-US" smtClean="0"/>
               <a:pPr/>
-              <a:t>6/17/2014</a:t>
+              <a:t>6/18/2014</a:t>
             </a:fld>
             <a:endParaRPr lang="en-US"/>
           </a:p>
@@ -1330,7 +1346,7 @@
             <a:fld id="{23B2260A-7C61-451E-ACDE-7DEE4EF3F87B}" type="datetimeFigureOut">
               <a:rPr lang="en-US" smtClean="0"/>
               <a:pPr/>
-              <a:t>6/17/2014</a:t>
+              <a:t>6/18/2014</a:t>
             </a:fld>
             <a:endParaRPr lang="en-US"/>
           </a:p>
@@ -1749,7 +1765,7 @@
             <a:fld id="{23B2260A-7C61-451E-ACDE-7DEE4EF3F87B}" type="datetimeFigureOut">
               <a:rPr lang="en-US" smtClean="0"/>
               <a:pPr/>
-              <a:t>6/17/2014</a:t>
+              <a:t>6/18/2014</a:t>
             </a:fld>
             <a:endParaRPr lang="en-US"/>
           </a:p>
@@ -1864,7 +1880,7 @@
             <a:fld id="{23B2260A-7C61-451E-ACDE-7DEE4EF3F87B}" type="datetimeFigureOut">
               <a:rPr lang="en-US" smtClean="0"/>
               <a:pPr/>
-              <a:t>6/17/2014</a:t>
+              <a:t>6/18/2014</a:t>
             </a:fld>
             <a:endParaRPr lang="en-US"/>
           </a:p>
@@ -1956,7 +1972,7 @@
             <a:fld id="{23B2260A-7C61-451E-ACDE-7DEE4EF3F87B}" type="datetimeFigureOut">
               <a:rPr lang="en-US" smtClean="0"/>
               <a:pPr/>
-              <a:t>6/17/2014</a:t>
+              <a:t>6/18/2014</a:t>
             </a:fld>
             <a:endParaRPr lang="en-US"/>
           </a:p>
@@ -2230,7 +2246,7 @@
             <a:fld id="{23B2260A-7C61-451E-ACDE-7DEE4EF3F87B}" type="datetimeFigureOut">
               <a:rPr lang="en-US" smtClean="0"/>
               <a:pPr/>
-              <a:t>6/17/2014</a:t>
+              <a:t>6/18/2014</a:t>
             </a:fld>
             <a:endParaRPr lang="en-US"/>
           </a:p>
@@ -2480,7 +2496,7 @@
             <a:fld id="{23B2260A-7C61-451E-ACDE-7DEE4EF3F87B}" type="datetimeFigureOut">
               <a:rPr lang="en-US" smtClean="0"/>
               <a:pPr/>
-              <a:t>6/17/2014</a:t>
+              <a:t>6/18/2014</a:t>
             </a:fld>
             <a:endParaRPr lang="en-US"/>
           </a:p>
@@ -2690,7 +2706,7 @@
             <a:fld id="{23B2260A-7C61-451E-ACDE-7DEE4EF3F87B}" type="datetimeFigureOut">
               <a:rPr lang="en-US" smtClean="0"/>
               <a:pPr/>
-              <a:t>6/17/2014</a:t>
+              <a:t>6/18/2014</a:t>
             </a:fld>
             <a:endParaRPr lang="en-US"/>
           </a:p>

</xml_diff>